<commit_message>
Capítulo 8: Sincronização de métodos.
</commit_message>
<xml_diff>
--- a/2-Java-Programmer-Modulo-II/01.Capitulo01.pptx
+++ b/2-Java-Programmer-Modulo-II/01.Capitulo01.pptx
@@ -268,7 +268,7 @@
               <a:pPr>
                 <a:defRPr/>
               </a:pPr>
-              <a:t>16/04/2012</a:t>
+              <a:t>22/04/2012</a:t>
             </a:fld>
             <a:endParaRPr lang="pt-BR"/>
           </a:p>
@@ -3404,7 +3404,7 @@
               <a:pPr>
                 <a:defRPr/>
               </a:pPr>
-              <a:t>16/04/2012</a:t>
+              <a:t>22/04/2012</a:t>
             </a:fld>
             <a:endParaRPr lang="pt-BR"/>
           </a:p>
@@ -3596,7 +3596,7 @@
               <a:pPr>
                 <a:defRPr/>
               </a:pPr>
-              <a:t>16/04/2012</a:t>
+              <a:t>22/04/2012</a:t>
             </a:fld>
             <a:endParaRPr lang="pt-BR"/>
           </a:p>
@@ -3798,7 +3798,7 @@
               <a:pPr>
                 <a:defRPr/>
               </a:pPr>
-              <a:t>16/04/2012</a:t>
+              <a:t>22/04/2012</a:t>
             </a:fld>
             <a:endParaRPr lang="pt-BR"/>
           </a:p>
@@ -3994,7 +3994,7 @@
               <a:pPr>
                 <a:defRPr/>
               </a:pPr>
-              <a:t>16/04/2012</a:t>
+              <a:t>22/04/2012</a:t>
             </a:fld>
             <a:endParaRPr lang="pt-BR"/>
           </a:p>
@@ -4500,7 +4500,7 @@
               <a:pPr>
                 <a:defRPr/>
               </a:pPr>
-              <a:t>16/04/2012</a:t>
+              <a:t>22/04/2012</a:t>
             </a:fld>
             <a:endParaRPr lang="pt-BR"/>
           </a:p>
@@ -4791,7 +4791,7 @@
               <a:pPr>
                 <a:defRPr/>
               </a:pPr>
-              <a:t>16/04/2012</a:t>
+              <a:t>22/04/2012</a:t>
             </a:fld>
             <a:endParaRPr lang="pt-BR"/>
           </a:p>
@@ -5192,7 +5192,7 @@
               <a:pPr>
                 <a:defRPr/>
               </a:pPr>
-              <a:t>16/04/2012</a:t>
+              <a:t>22/04/2012</a:t>
             </a:fld>
             <a:endParaRPr lang="pt-BR"/>
           </a:p>
@@ -5341,7 +5341,7 @@
               <a:pPr>
                 <a:defRPr/>
               </a:pPr>
-              <a:t>16/04/2012</a:t>
+              <a:t>22/04/2012</a:t>
             </a:fld>
             <a:endParaRPr lang="pt-BR"/>
           </a:p>
@@ -5458,7 +5458,7 @@
               <a:pPr>
                 <a:defRPr/>
               </a:pPr>
-              <a:t>16/04/2012</a:t>
+              <a:t>22/04/2012</a:t>
             </a:fld>
             <a:endParaRPr lang="pt-BR"/>
           </a:p>
@@ -5734,7 +5734,7 @@
               <a:pPr>
                 <a:defRPr/>
               </a:pPr>
-              <a:t>16/04/2012</a:t>
+              <a:t>22/04/2012</a:t>
             </a:fld>
             <a:endParaRPr lang="pt-BR"/>
           </a:p>
@@ -6018,7 +6018,7 @@
               <a:pPr>
                 <a:defRPr/>
               </a:pPr>
-              <a:t>16/04/2012</a:t>
+              <a:t>22/04/2012</a:t>
             </a:fld>
             <a:endParaRPr lang="pt-BR"/>
           </a:p>
@@ -6496,7 +6496,7 @@
               <a:pPr>
                 <a:defRPr/>
               </a:pPr>
-              <a:t>16/04/2012</a:t>
+              <a:t>22/04/2012</a:t>
             </a:fld>
             <a:endParaRPr lang="pt-BR"/>
           </a:p>
@@ -9870,13 +9870,8 @@
             <a:pPr eaLnBrk="1" hangingPunct="1"/>
             <a:r>
               <a:rPr lang="pt-BR" dirty="0" smtClean="0"/>
-              <a:t>Classe </a:t>
-            </a:r>
-            <a:r>
-              <a:rPr lang="pt-BR" dirty="0" smtClean="0"/>
-              <a:t>interna anônima</a:t>
-            </a:r>
-            <a:endParaRPr lang="pt-BR" dirty="0" smtClean="0"/>
+              <a:t>Classe interna anônima</a:t>
+            </a:r>
           </a:p>
         </p:txBody>
       </p:sp>
@@ -13162,7 +13157,6 @@
               <a:rPr lang="pt-BR" sz="2000" dirty="0" smtClean="0"/>
               <a:t> {</a:t>
             </a:r>
-            <a:endParaRPr lang="pt-BR" sz="2000" dirty="0" smtClean="0"/>
           </a:p>
           <a:p>
             <a:pPr marL="442913" indent="0">
@@ -13198,15 +13192,7 @@
             </a:r>
             <a:r>
               <a:rPr lang="pt-BR" sz="2000" dirty="0" smtClean="0"/>
-              <a:t> </a:t>
-            </a:r>
-            <a:r>
-              <a:rPr lang="pt-BR" sz="2000" dirty="0" smtClean="0"/>
-              <a:t>metodo1() </a:t>
-            </a:r>
-            <a:r>
-              <a:rPr lang="pt-BR" sz="2000" dirty="0" smtClean="0"/>
-              <a:t>{</a:t>
+              <a:t> metodo1() {</a:t>
             </a:r>
           </a:p>
           <a:p>
@@ -13247,17 +13233,12 @@
             </a:r>
             <a:r>
               <a:rPr lang="pt-BR" sz="2000" dirty="0" err="1" smtClean="0"/>
-              <a:t>A</a:t>
-            </a:r>
-            <a:r>
-              <a:rPr lang="pt-BR" sz="2000" dirty="0" err="1" smtClean="0"/>
-              <a:t>lpha</a:t>
+              <a:t>Alpha</a:t>
             </a:r>
             <a:r>
               <a:rPr lang="pt-BR" sz="2000" dirty="0" smtClean="0"/>
               <a:t>");</a:t>
             </a:r>
-            <a:endParaRPr lang="pt-BR" sz="2000" dirty="0" smtClean="0"/>
           </a:p>
           <a:p>
             <a:pPr marL="442913" indent="0">
@@ -13314,11 +13295,7 @@
             </a:r>
             <a:r>
               <a:rPr lang="pt-BR" sz="2000" dirty="0" smtClean="0"/>
-              <a:t> Beta </a:t>
-            </a:r>
-            <a:r>
-              <a:rPr lang="pt-BR" sz="2000" dirty="0" smtClean="0"/>
-              <a:t>{</a:t>
+              <a:t> Beta {</a:t>
             </a:r>
           </a:p>
           <a:p>
@@ -13355,15 +13332,7 @@
             </a:r>
             <a:r>
               <a:rPr lang="pt-BR" sz="2000" dirty="0" smtClean="0"/>
-              <a:t> </a:t>
-            </a:r>
-            <a:r>
-              <a:rPr lang="pt-BR" sz="2000" dirty="0" smtClean="0"/>
-              <a:t>metodo2() </a:t>
-            </a:r>
-            <a:r>
-              <a:rPr lang="pt-BR" sz="2000" dirty="0" smtClean="0"/>
-              <a:t>{</a:t>
+              <a:t> metodo2() {</a:t>
             </a:r>
           </a:p>
           <a:p>
@@ -13402,7 +13371,6 @@
               <a:rPr lang="pt-BR" sz="2000" dirty="0" smtClean="0"/>
               <a:t> da classe Beta");</a:t>
             </a:r>
-            <a:endParaRPr lang="pt-BR" sz="2000" dirty="0" smtClean="0"/>
           </a:p>
           <a:p>
             <a:pPr marL="442913" indent="0">
@@ -13459,11 +13427,7 @@
             </a:r>
             <a:r>
               <a:rPr lang="pt-BR" sz="2000" dirty="0" smtClean="0"/>
-              <a:t> Gama </a:t>
-            </a:r>
-            <a:r>
-              <a:rPr lang="pt-BR" sz="2000" dirty="0" smtClean="0"/>
-              <a:t>{</a:t>
+              <a:t> Gama {</a:t>
             </a:r>
           </a:p>
           <a:p>
@@ -13500,15 +13464,7 @@
             </a:r>
             <a:r>
               <a:rPr lang="pt-BR" sz="2000" dirty="0" smtClean="0"/>
-              <a:t> </a:t>
-            </a:r>
-            <a:r>
-              <a:rPr lang="pt-BR" sz="2000" dirty="0" smtClean="0"/>
-              <a:t>metodo3() </a:t>
-            </a:r>
-            <a:r>
-              <a:rPr lang="pt-BR" sz="2000" dirty="0" smtClean="0"/>
-              <a:t>{</a:t>
+              <a:t> metodo3() {</a:t>
             </a:r>
           </a:p>
           <a:p>
@@ -13547,7 +13503,6 @@
               <a:rPr lang="pt-BR" sz="2000" dirty="0" smtClean="0"/>
               <a:t> da classe Gama");</a:t>
             </a:r>
-            <a:endParaRPr lang="pt-BR" sz="2000" dirty="0" smtClean="0"/>
           </a:p>
           <a:p>
             <a:pPr marL="442913" indent="0">
@@ -18148,13 +18103,8 @@
             <a:pPr eaLnBrk="1" hangingPunct="1"/>
             <a:r>
               <a:rPr lang="pt-BR" dirty="0" smtClean="0"/>
-              <a:t>Classe </a:t>
-            </a:r>
-            <a:r>
-              <a:rPr lang="pt-BR" dirty="0" smtClean="0"/>
-              <a:t>interna</a:t>
-            </a:r>
-            <a:endParaRPr lang="pt-BR" dirty="0" smtClean="0"/>
+              <a:t>Classe interna</a:t>
+            </a:r>
           </a:p>
         </p:txBody>
       </p:sp>
@@ -19006,7 +18956,23 @@
                   <a:srgbClr val="00B050"/>
                 </a:solidFill>
               </a:rPr>
-              <a:t>		/* Grava os dados do aluno na base de dados (síncrono). */</a:t>
+              <a:t>		/* Grava os dados do aluno na base de </a:t>
+            </a:r>
+            <a:r>
+              <a:rPr lang="pt-BR" sz="2000" dirty="0" smtClean="0">
+                <a:solidFill>
+                  <a:srgbClr val="00B050"/>
+                </a:solidFill>
+              </a:rPr>
+              <a:t>dados. </a:t>
+            </a:r>
+            <a:r>
+              <a:rPr lang="pt-BR" sz="2000" dirty="0" smtClean="0">
+                <a:solidFill>
+                  <a:srgbClr val="00B050"/>
+                </a:solidFill>
+              </a:rPr>
+              <a:t>*/</a:t>
             </a:r>
           </a:p>
           <a:p>
@@ -19068,7 +19034,23 @@
                   <a:srgbClr val="00B050"/>
                 </a:solidFill>
               </a:rPr>
-              <a:t>		/* Envia um email ao aluno (assíncrono). */</a:t>
+              <a:t>		/* Envia um email ao aluno </a:t>
+            </a:r>
+            <a:r>
+              <a:rPr lang="pt-BR" sz="2000" dirty="0" smtClean="0">
+                <a:solidFill>
+                  <a:srgbClr val="00B050"/>
+                </a:solidFill>
+              </a:rPr>
+              <a:t>de forma assíncrona (thread). </a:t>
+            </a:r>
+            <a:r>
+              <a:rPr lang="pt-BR" sz="2000" dirty="0" smtClean="0">
+                <a:solidFill>
+                  <a:srgbClr val="00B050"/>
+                </a:solidFill>
+              </a:rPr>
+              <a:t>*/</a:t>
             </a:r>
           </a:p>
           <a:p>
@@ -19371,17 +19353,8 @@
             </a:r>
             <a:r>
               <a:rPr lang="pt-BR" sz="2000" dirty="0" smtClean="0"/>
-              <a:t> </a:t>
-            </a:r>
-            <a:r>
-              <a:rPr lang="pt-BR" sz="2000" dirty="0" smtClean="0"/>
-              <a:t>= </a:t>
-            </a:r>
-            <a:r>
-              <a:rPr lang="pt-BR" sz="2000" dirty="0" smtClean="0"/>
-              <a:t>3;</a:t>
-            </a:r>
-            <a:endParaRPr lang="pt-BR" sz="2000" dirty="0" smtClean="0"/>
+              <a:t> = 3;</a:t>
+            </a:r>
           </a:p>
           <a:p>
             <a:pPr marL="0" indent="0" eaLnBrk="1" hangingPunct="1">
@@ -19584,7 +19557,6 @@
               <a:rPr lang="pt-BR" sz="2000" dirty="0" smtClean="0"/>
               <a:t> = 8;</a:t>
             </a:r>
-            <a:endParaRPr lang="pt-BR" sz="2000" dirty="0" smtClean="0"/>
           </a:p>
           <a:p>
             <a:pPr marL="0" indent="0" eaLnBrk="1" hangingPunct="1">
@@ -19677,7 +19649,6 @@
               <a:rPr lang="pt-BR" sz="2000" dirty="0" smtClean="0"/>
               <a:t>* local;</a:t>
             </a:r>
-            <a:endParaRPr lang="pt-BR" sz="2000" dirty="0" smtClean="0"/>
           </a:p>
           <a:p>
             <a:pPr marL="0" indent="0" eaLnBrk="1" hangingPunct="1">
@@ -19805,11 +19776,7 @@
             </a:pPr>
             <a:r>
               <a:rPr lang="pt-BR" sz="2000" dirty="0" smtClean="0"/>
-              <a:t>		</a:t>
-            </a:r>
-            <a:r>
-              <a:rPr lang="pt-BR" sz="2000" dirty="0" smtClean="0"/>
-              <a:t>System.</a:t>
+              <a:t>		System.</a:t>
             </a:r>
             <a:r>
               <a:rPr lang="pt-BR" sz="2000" dirty="0" err="1" smtClean="0"/>
@@ -19827,7 +19794,6 @@
               <a:rPr lang="pt-BR" sz="2000" dirty="0" smtClean="0"/>
               <a:t>());</a:t>
             </a:r>
-            <a:endParaRPr lang="pt-BR" sz="2000" dirty="0" smtClean="0"/>
           </a:p>
           <a:p>
             <a:pPr marL="0" indent="0" eaLnBrk="1" hangingPunct="1">
@@ -21191,11 +21157,7 @@
             </a:pPr>
             <a:r>
               <a:rPr lang="pt-BR" sz="2800" dirty="0" smtClean="0"/>
-              <a:t>Uma classe interna local pode ser utilizada apenas dentro do método em que foi criada</a:t>
-            </a:r>
-            <a:r>
-              <a:rPr lang="pt-BR" sz="2800" dirty="0" smtClean="0"/>
-              <a:t>.</a:t>
+              <a:t>Uma classe interna local pode ser utilizada apenas dentro do método em que foi criada.</a:t>
             </a:r>
           </a:p>
           <a:p>
@@ -21243,7 +21205,6 @@
               <a:rPr lang="pt-BR" sz="2800" dirty="0" smtClean="0"/>
               <a:t>Uma classe interna local só pode utilizar uma variável local ao método onde ela se encontra se a variável local for uma constante (final).</a:t>
             </a:r>
-            <a:endParaRPr lang="pt-BR" sz="2800" dirty="0" smtClean="0"/>
           </a:p>
         </p:txBody>
       </p:sp>

</xml_diff>

<commit_message>
Correções diversas de problemas encontrados durante a aula.
</commit_message>
<xml_diff>
--- a/2-Java-Programmer-Modulo-II/01.Capitulo01.pptx
+++ b/2-Java-Programmer-Modulo-II/01.Capitulo01.pptx
@@ -268,7 +268,7 @@
               <a:pPr>
                 <a:defRPr/>
               </a:pPr>
-              <a:t>05/05/2012</a:t>
+              <a:t>30/6/2012</a:t>
             </a:fld>
             <a:endParaRPr lang="pt-BR"/>
           </a:p>
@@ -3404,7 +3404,7 @@
               <a:pPr>
                 <a:defRPr/>
               </a:pPr>
-              <a:t>05/05/2012</a:t>
+              <a:t>30/6/2012</a:t>
             </a:fld>
             <a:endParaRPr lang="pt-BR"/>
           </a:p>
@@ -3596,7 +3596,7 @@
               <a:pPr>
                 <a:defRPr/>
               </a:pPr>
-              <a:t>05/05/2012</a:t>
+              <a:t>30/6/2012</a:t>
             </a:fld>
             <a:endParaRPr lang="pt-BR"/>
           </a:p>
@@ -3798,7 +3798,7 @@
               <a:pPr>
                 <a:defRPr/>
               </a:pPr>
-              <a:t>05/05/2012</a:t>
+              <a:t>30/6/2012</a:t>
             </a:fld>
             <a:endParaRPr lang="pt-BR"/>
           </a:p>
@@ -3994,7 +3994,7 @@
               <a:pPr>
                 <a:defRPr/>
               </a:pPr>
-              <a:t>05/05/2012</a:t>
+              <a:t>30/6/2012</a:t>
             </a:fld>
             <a:endParaRPr lang="pt-BR"/>
           </a:p>
@@ -4500,7 +4500,7 @@
               <a:pPr>
                 <a:defRPr/>
               </a:pPr>
-              <a:t>05/05/2012</a:t>
+              <a:t>30/6/2012</a:t>
             </a:fld>
             <a:endParaRPr lang="pt-BR"/>
           </a:p>
@@ -4791,7 +4791,7 @@
               <a:pPr>
                 <a:defRPr/>
               </a:pPr>
-              <a:t>05/05/2012</a:t>
+              <a:t>30/6/2012</a:t>
             </a:fld>
             <a:endParaRPr lang="pt-BR"/>
           </a:p>
@@ -5192,7 +5192,7 @@
               <a:pPr>
                 <a:defRPr/>
               </a:pPr>
-              <a:t>05/05/2012</a:t>
+              <a:t>30/6/2012</a:t>
             </a:fld>
             <a:endParaRPr lang="pt-BR"/>
           </a:p>
@@ -5341,7 +5341,7 @@
               <a:pPr>
                 <a:defRPr/>
               </a:pPr>
-              <a:t>05/05/2012</a:t>
+              <a:t>30/6/2012</a:t>
             </a:fld>
             <a:endParaRPr lang="pt-BR"/>
           </a:p>
@@ -5458,7 +5458,7 @@
               <a:pPr>
                 <a:defRPr/>
               </a:pPr>
-              <a:t>05/05/2012</a:t>
+              <a:t>30/6/2012</a:t>
             </a:fld>
             <a:endParaRPr lang="pt-BR"/>
           </a:p>
@@ -5734,7 +5734,7 @@
               <a:pPr>
                 <a:defRPr/>
               </a:pPr>
-              <a:t>05/05/2012</a:t>
+              <a:t>30/6/2012</a:t>
             </a:fld>
             <a:endParaRPr lang="pt-BR"/>
           </a:p>
@@ -6018,7 +6018,7 @@
               <a:pPr>
                 <a:defRPr/>
               </a:pPr>
-              <a:t>05/05/2012</a:t>
+              <a:t>30/6/2012</a:t>
             </a:fld>
             <a:endParaRPr lang="pt-BR"/>
           </a:p>
@@ -6496,7 +6496,7 @@
               <a:pPr>
                 <a:defRPr/>
               </a:pPr>
-              <a:t>05/05/2012</a:t>
+              <a:t>30/6/2012</a:t>
             </a:fld>
             <a:endParaRPr lang="pt-BR"/>
           </a:p>
@@ -8876,7 +8876,7 @@
         <p:spPr>
           <a:xfrm>
             <a:off x="457200" y="274638"/>
-            <a:ext cx="8507288" cy="1143000"/>
+            <a:ext cx="8258204" cy="1143000"/>
           </a:xfrm>
         </p:spPr>
         <p:txBody>
@@ -8885,7 +8885,7 @@
           <a:p>
             <a:pPr eaLnBrk="1" hangingPunct="1"/>
             <a:r>
-              <a:rPr lang="pt-BR" dirty="0" smtClean="0"/>
+              <a:rPr lang="pt-BR" sz="4000" dirty="0" smtClean="0"/>
               <a:t>Classe interna anônima (exemplo)</a:t>
             </a:r>
           </a:p>

</xml_diff>

<commit_message>
Criação da brach "extended"
</commit_message>
<xml_diff>
--- a/2-Java-Programmer-Modulo-II/01.Capitulo01.pptx
+++ b/2-Java-Programmer-Modulo-II/01.Capitulo01.pptx
@@ -268,7 +268,7 @@
               <a:pPr>
                 <a:defRPr/>
               </a:pPr>
-              <a:t>30/6/2012</a:t>
+              <a:t>05/05/2012</a:t>
             </a:fld>
             <a:endParaRPr lang="pt-BR"/>
           </a:p>
@@ -3404,7 +3404,7 @@
               <a:pPr>
                 <a:defRPr/>
               </a:pPr>
-              <a:t>30/6/2012</a:t>
+              <a:t>05/05/2012</a:t>
             </a:fld>
             <a:endParaRPr lang="pt-BR"/>
           </a:p>
@@ -3596,7 +3596,7 @@
               <a:pPr>
                 <a:defRPr/>
               </a:pPr>
-              <a:t>30/6/2012</a:t>
+              <a:t>05/05/2012</a:t>
             </a:fld>
             <a:endParaRPr lang="pt-BR"/>
           </a:p>
@@ -3798,7 +3798,7 @@
               <a:pPr>
                 <a:defRPr/>
               </a:pPr>
-              <a:t>30/6/2012</a:t>
+              <a:t>05/05/2012</a:t>
             </a:fld>
             <a:endParaRPr lang="pt-BR"/>
           </a:p>
@@ -3994,7 +3994,7 @@
               <a:pPr>
                 <a:defRPr/>
               </a:pPr>
-              <a:t>30/6/2012</a:t>
+              <a:t>05/05/2012</a:t>
             </a:fld>
             <a:endParaRPr lang="pt-BR"/>
           </a:p>
@@ -4500,7 +4500,7 @@
               <a:pPr>
                 <a:defRPr/>
               </a:pPr>
-              <a:t>30/6/2012</a:t>
+              <a:t>05/05/2012</a:t>
             </a:fld>
             <a:endParaRPr lang="pt-BR"/>
           </a:p>
@@ -4791,7 +4791,7 @@
               <a:pPr>
                 <a:defRPr/>
               </a:pPr>
-              <a:t>30/6/2012</a:t>
+              <a:t>05/05/2012</a:t>
             </a:fld>
             <a:endParaRPr lang="pt-BR"/>
           </a:p>
@@ -5192,7 +5192,7 @@
               <a:pPr>
                 <a:defRPr/>
               </a:pPr>
-              <a:t>30/6/2012</a:t>
+              <a:t>05/05/2012</a:t>
             </a:fld>
             <a:endParaRPr lang="pt-BR"/>
           </a:p>
@@ -5341,7 +5341,7 @@
               <a:pPr>
                 <a:defRPr/>
               </a:pPr>
-              <a:t>30/6/2012</a:t>
+              <a:t>05/05/2012</a:t>
             </a:fld>
             <a:endParaRPr lang="pt-BR"/>
           </a:p>
@@ -5458,7 +5458,7 @@
               <a:pPr>
                 <a:defRPr/>
               </a:pPr>
-              <a:t>30/6/2012</a:t>
+              <a:t>05/05/2012</a:t>
             </a:fld>
             <a:endParaRPr lang="pt-BR"/>
           </a:p>
@@ -5734,7 +5734,7 @@
               <a:pPr>
                 <a:defRPr/>
               </a:pPr>
-              <a:t>30/6/2012</a:t>
+              <a:t>05/05/2012</a:t>
             </a:fld>
             <a:endParaRPr lang="pt-BR"/>
           </a:p>
@@ -6018,7 +6018,7 @@
               <a:pPr>
                 <a:defRPr/>
               </a:pPr>
-              <a:t>30/6/2012</a:t>
+              <a:t>05/05/2012</a:t>
             </a:fld>
             <a:endParaRPr lang="pt-BR"/>
           </a:p>
@@ -6496,7 +6496,7 @@
               <a:pPr>
                 <a:defRPr/>
               </a:pPr>
-              <a:t>30/6/2012</a:t>
+              <a:t>05/05/2012</a:t>
             </a:fld>
             <a:endParaRPr lang="pt-BR"/>
           </a:p>
@@ -8876,7 +8876,7 @@
         <p:spPr>
           <a:xfrm>
             <a:off x="457200" y="274638"/>
-            <a:ext cx="8258204" cy="1143000"/>
+            <a:ext cx="8507288" cy="1143000"/>
           </a:xfrm>
         </p:spPr>
         <p:txBody>
@@ -8885,7 +8885,7 @@
           <a:p>
             <a:pPr eaLnBrk="1" hangingPunct="1"/>
             <a:r>
-              <a:rPr lang="pt-BR" sz="4000" dirty="0" smtClean="0"/>
+              <a:rPr lang="pt-BR" dirty="0" smtClean="0"/>
               <a:t>Classe interna anônima (exemplo)</a:t>
             </a:r>
           </a:p>

</xml_diff>